<commit_message>
Update: Se modifica documento
</commit_message>
<xml_diff>
--- a/Presentación_Proyecto.pptx
+++ b/Presentación_Proyecto.pptx
@@ -5,16 +5,17 @@
     <p:sldMasterId id="2147483648" r:id="rId1"/>
   </p:sldMasterIdLst>
   <p:notesMasterIdLst>
-    <p:notesMasterId r:id="rId9"/>
+    <p:notesMasterId r:id="rId10"/>
   </p:notesMasterIdLst>
   <p:sldIdLst>
     <p:sldId id="256" r:id="rId2"/>
     <p:sldId id="257" r:id="rId3"/>
     <p:sldId id="258" r:id="rId4"/>
     <p:sldId id="259" r:id="rId5"/>
-    <p:sldId id="264" r:id="rId6"/>
-    <p:sldId id="265" r:id="rId7"/>
-    <p:sldId id="263" r:id="rId8"/>
+    <p:sldId id="266" r:id="rId6"/>
+    <p:sldId id="267" r:id="rId7"/>
+    <p:sldId id="264" r:id="rId8"/>
+    <p:sldId id="263" r:id="rId9"/>
   </p:sldIdLst>
   <p:sldSz cx="9144000" cy="5143500" type="screen16x9"/>
   <p:notesSz cx="6858000" cy="9144000"/>
@@ -263,7 +264,7 @@
       </p15:sldGuideLst>
     </p:ext>
     <p:ext uri="http://customooxmlschemas.google.com/">
-      <go:slidesCustomData xmlns="" xmlns:mc="http://schemas.openxmlformats.org/markup-compatibility/2006" xmlns:mv="urn:schemas-microsoft-com:mac:vml" xmlns:c="http://schemas.openxmlformats.org/drawingml/2006/chart" xmlns:dgm="http://schemas.openxmlformats.org/drawingml/2006/diagram" xmlns:o="urn:schemas-microsoft-com:office:office" xmlns:v="urn:schemas-microsoft-com:vml" xmlns:pvml="urn:schemas-microsoft-com:office:powerpoint" xmlns:com="http://schemas.openxmlformats.org/drawingml/2006/compatibility" xmlns:p14="http://schemas.microsoft.com/office/powerpoint/2010/main" xmlns:p15="http://schemas.microsoft.com/office/powerpoint/2012/main" xmlns:go="http://customooxmlschemas.google.com/" r:id="rId14" roundtripDataSignature="AMtx7mhcDBriehLUDBxjftDJit6CAeC0zQ=="/>
+      <go:slidesCustomData xmlns:go="http://customooxmlschemas.google.com/" xmlns:p15="http://schemas.microsoft.com/office/powerpoint/2012/main" xmlns:p14="http://schemas.microsoft.com/office/powerpoint/2010/main" xmlns:com="http://schemas.openxmlformats.org/drawingml/2006/compatibility" xmlns:pvml="urn:schemas-microsoft-com:office:powerpoint" xmlns:v="urn:schemas-microsoft-com:vml" xmlns:o="urn:schemas-microsoft-com:office:office" xmlns:dgm="http://schemas.openxmlformats.org/drawingml/2006/diagram" xmlns:c="http://schemas.openxmlformats.org/drawingml/2006/chart" xmlns:mv="urn:schemas-microsoft-com:mac:vml" xmlns:mc="http://schemas.openxmlformats.org/markup-compatibility/2006" xmlns="" r:id="rId14" roundtripDataSignature="AMtx7mhcDBriehLUDBxjftDJit6CAeC0zQ=="/>
     </p:ext>
   </p:extLst>
 </p:presentation>
@@ -907,7 +908,7 @@
               <a:buSzPts val="1100"/>
               <a:buNone/>
             </a:pPr>
-            <a:endParaRPr/>
+            <a:endParaRPr dirty="0"/>
           </a:p>
         </p:txBody>
       </p:sp>
@@ -1029,7 +1030,7 @@
               <a:buSzPts val="1100"/>
               <a:buNone/>
             </a:pPr>
-            <a:endParaRPr/>
+            <a:endParaRPr dirty="0"/>
           </a:p>
         </p:txBody>
       </p:sp>
@@ -1202,7 +1203,7 @@
               <a:buSzPts val="1100"/>
               <a:buNone/>
             </a:pPr>
-            <a:endParaRPr sz="1200" b="0" i="0" u="none" strike="noStrike" cap="none">
+            <a:endParaRPr sz="1200" b="0" i="0" u="none" strike="noStrike" cap="none" dirty="0">
               <a:solidFill>
                 <a:schemeClr val="dk1"/>
               </a:solidFill>
@@ -1272,7 +1273,7 @@
               </a:rPr>
               <a:t>3</a:t>
             </a:fld>
-            <a:endParaRPr sz="1200" b="0" i="0" u="none" strike="noStrike" cap="none">
+            <a:endParaRPr sz="1200" b="0" i="0" u="none" strike="noStrike" cap="none" dirty="0">
               <a:solidFill>
                 <a:schemeClr val="dk1"/>
               </a:solidFill>
@@ -1402,7 +1403,7 @@
               <a:buSzPts val="1100"/>
               <a:buNone/>
             </a:pPr>
-            <a:endParaRPr sz="1200" b="0" i="0" u="none" strike="noStrike" cap="none">
+            <a:endParaRPr sz="1200" b="0" i="0" u="none" strike="noStrike" cap="none" dirty="0">
               <a:solidFill>
                 <a:schemeClr val="dk1"/>
               </a:solidFill>
@@ -1472,7 +1473,7 @@
               </a:rPr>
               <a:t>4</a:t>
             </a:fld>
-            <a:endParaRPr sz="1200" b="0" i="0" u="none" strike="noStrike" cap="none">
+            <a:endParaRPr sz="1200" b="0" i="0" u="none" strike="noStrike" cap="none" dirty="0">
               <a:solidFill>
                 <a:schemeClr val="dk1"/>
               </a:solidFill>
@@ -1551,7 +1552,7 @@
               <a:buSzPts val="1100"/>
               <a:buNone/>
             </a:pPr>
-            <a:endParaRPr/>
+            <a:endParaRPr dirty="0"/>
           </a:p>
         </p:txBody>
       </p:sp>
@@ -1804,7 +1805,7 @@
               <a:buFont typeface="Arial"/>
               <a:buNone/>
             </a:pPr>
-            <a:endParaRPr sz="8000" b="1" i="0" u="none" strike="noStrike" cap="none">
+            <a:endParaRPr sz="8000" b="1" i="0" u="none" strike="noStrike" cap="none" dirty="0">
               <a:solidFill>
                 <a:srgbClr val="92D050"/>
               </a:solidFill>
@@ -2184,7 +2185,7 @@
             </a:lvl9pPr>
           </a:lstStyle>
           <a:p>
-            <a:endParaRPr/>
+            <a:endParaRPr dirty="0"/>
           </a:p>
         </p:txBody>
       </p:sp>
@@ -2452,7 +2453,7 @@
             </a:lvl9pPr>
           </a:lstStyle>
           <a:p>
-            <a:endParaRPr/>
+            <a:endParaRPr dirty="0"/>
           </a:p>
         </p:txBody>
       </p:sp>
@@ -2733,7 +2734,7 @@
               <a:rPr lang="es"/>
               <a:t>‹Nº›</a:t>
             </a:fld>
-            <a:endParaRPr/>
+            <a:endParaRPr dirty="0"/>
           </a:p>
         </p:txBody>
       </p:sp>
@@ -3107,7 +3108,7 @@
             </a:lvl9pPr>
           </a:lstStyle>
           <a:p>
-            <a:endParaRPr/>
+            <a:endParaRPr dirty="0"/>
           </a:p>
         </p:txBody>
       </p:sp>
@@ -3375,7 +3376,7 @@
             </a:lvl9pPr>
           </a:lstStyle>
           <a:p>
-            <a:endParaRPr/>
+            <a:endParaRPr dirty="0"/>
           </a:p>
         </p:txBody>
       </p:sp>
@@ -3656,7 +3657,7 @@
               <a:rPr lang="es"/>
               <a:t>‹Nº›</a:t>
             </a:fld>
-            <a:endParaRPr/>
+            <a:endParaRPr dirty="0"/>
           </a:p>
         </p:txBody>
       </p:sp>
@@ -3704,7 +3705,7 @@
               <a:buFont typeface="Arial"/>
               <a:buNone/>
             </a:pPr>
-            <a:endParaRPr sz="1800" b="0" i="0" u="none" strike="noStrike" cap="none">
+            <a:endParaRPr sz="1800" b="0" i="0" u="none" strike="noStrike" cap="none" dirty="0">
               <a:solidFill>
                 <a:schemeClr val="lt1"/>
               </a:solidFill>
@@ -3760,7 +3761,7 @@
               <a:buFont typeface="Arial"/>
               <a:buNone/>
             </a:pPr>
-            <a:endParaRPr sz="1800" b="0" i="0" u="none" strike="noStrike" cap="none">
+            <a:endParaRPr sz="1800" b="0" i="0" u="none" strike="noStrike" cap="none" dirty="0">
               <a:solidFill>
                 <a:schemeClr val="lt1"/>
               </a:solidFill>
@@ -3816,7 +3817,7 @@
               <a:buFont typeface="Arial"/>
               <a:buNone/>
             </a:pPr>
-            <a:endParaRPr sz="1800" b="0" i="0" u="none" strike="noStrike" cap="none">
+            <a:endParaRPr sz="1800" b="0" i="0" u="none" strike="noStrike" cap="none" dirty="0">
               <a:solidFill>
                 <a:schemeClr val="lt1"/>
               </a:solidFill>
@@ -4117,7 +4118,7 @@
             </a:lvl9pPr>
           </a:lstStyle>
           <a:p>
-            <a:endParaRPr/>
+            <a:endParaRPr dirty="0"/>
           </a:p>
         </p:txBody>
       </p:sp>
@@ -4385,7 +4386,7 @@
             </a:lvl9pPr>
           </a:lstStyle>
           <a:p>
-            <a:endParaRPr/>
+            <a:endParaRPr dirty="0"/>
           </a:p>
         </p:txBody>
       </p:sp>
@@ -4666,7 +4667,7 @@
               <a:rPr lang="es"/>
               <a:t>‹Nº›</a:t>
             </a:fld>
-            <a:endParaRPr/>
+            <a:endParaRPr dirty="0"/>
           </a:p>
         </p:txBody>
       </p:sp>
@@ -4714,7 +4715,7 @@
               <a:buFont typeface="Arial"/>
               <a:buNone/>
             </a:pPr>
-            <a:endParaRPr sz="1800" b="0" i="0" u="none" strike="noStrike" cap="none">
+            <a:endParaRPr sz="1800" b="0" i="0" u="none" strike="noStrike" cap="none" dirty="0">
               <a:solidFill>
                 <a:schemeClr val="lt1"/>
               </a:solidFill>
@@ -4770,7 +4771,7 @@
               <a:buFont typeface="Arial"/>
               <a:buNone/>
             </a:pPr>
-            <a:endParaRPr sz="1800" b="0" i="0" u="none" strike="noStrike" cap="none">
+            <a:endParaRPr sz="1800" b="0" i="0" u="none" strike="noStrike" cap="none" dirty="0">
               <a:solidFill>
                 <a:schemeClr val="lt1"/>
               </a:solidFill>
@@ -4826,7 +4827,7 @@
               <a:buFont typeface="Arial"/>
               <a:buNone/>
             </a:pPr>
-            <a:endParaRPr sz="1800" b="0" i="0" u="none" strike="noStrike" cap="none">
+            <a:endParaRPr sz="1800" b="0" i="0" u="none" strike="noStrike" cap="none" dirty="0">
               <a:solidFill>
                 <a:schemeClr val="lt1"/>
               </a:solidFill>
@@ -4963,7 +4964,7 @@
                 <a:buFont typeface="Arial"/>
                 <a:buNone/>
               </a:pPr>
-              <a:endParaRPr sz="1800" b="0" i="0" u="none" strike="noStrike" cap="none">
+              <a:endParaRPr sz="1800" b="0" i="0" u="none" strike="noStrike" cap="none" dirty="0">
                 <a:solidFill>
                   <a:schemeClr val="lt1"/>
                 </a:solidFill>
@@ -5099,7 +5100,7 @@
               <a:buFont typeface="Arial"/>
               <a:buNone/>
             </a:pPr>
-            <a:endParaRPr sz="3200" b="0" i="0" u="none" strike="noStrike" cap="none">
+            <a:endParaRPr sz="3200" b="0" i="0" u="none" strike="noStrike" cap="none" dirty="0">
               <a:solidFill>
                 <a:schemeClr val="dk1"/>
               </a:solidFill>
@@ -5375,7 +5376,7 @@
             </a:lvl9pPr>
           </a:lstStyle>
           <a:p>
-            <a:endParaRPr/>
+            <a:endParaRPr dirty="0"/>
           </a:p>
         </p:txBody>
       </p:sp>
@@ -5643,7 +5644,7 @@
             </a:lvl9pPr>
           </a:lstStyle>
           <a:p>
-            <a:endParaRPr/>
+            <a:endParaRPr dirty="0"/>
           </a:p>
         </p:txBody>
       </p:sp>
@@ -5924,7 +5925,7 @@
               <a:rPr lang="es"/>
               <a:t>‹Nº›</a:t>
             </a:fld>
-            <a:endParaRPr/>
+            <a:endParaRPr dirty="0"/>
           </a:p>
         </p:txBody>
       </p:sp>
@@ -6217,7 +6218,7 @@
             </a:lvl9pPr>
           </a:lstStyle>
           <a:p>
-            <a:endParaRPr/>
+            <a:endParaRPr dirty="0"/>
           </a:p>
         </p:txBody>
       </p:sp>
@@ -6485,7 +6486,7 @@
             </a:lvl9pPr>
           </a:lstStyle>
           <a:p>
-            <a:endParaRPr/>
+            <a:endParaRPr dirty="0"/>
           </a:p>
         </p:txBody>
       </p:sp>
@@ -6766,7 +6767,7 @@
               <a:rPr lang="es"/>
               <a:t>‹Nº›</a:t>
             </a:fld>
-            <a:endParaRPr/>
+            <a:endParaRPr dirty="0"/>
           </a:p>
         </p:txBody>
       </p:sp>
@@ -6870,7 +6871,7 @@
                 <a:buFont typeface="Arial"/>
                 <a:buNone/>
               </a:pPr>
-              <a:endParaRPr sz="1800" b="0" i="0" u="none" strike="noStrike" cap="none">
+              <a:endParaRPr sz="1800" b="0" i="0" u="none" strike="noStrike" cap="none" dirty="0">
                 <a:solidFill>
                   <a:schemeClr val="lt1"/>
                 </a:solidFill>
@@ -6924,7 +6925,7 @@
                 <a:buFont typeface="Arial"/>
                 <a:buNone/>
               </a:pPr>
-              <a:endParaRPr sz="3200" b="0" i="0" u="none" strike="noStrike" cap="none">
+              <a:endParaRPr sz="3200" b="0" i="0" u="none" strike="noStrike" cap="none" dirty="0">
                 <a:solidFill>
                   <a:schemeClr val="dk1"/>
                 </a:solidFill>
@@ -7307,7 +7308,7 @@
             </a:lvl9pPr>
           </a:lstStyle>
           <a:p>
-            <a:endParaRPr/>
+            <a:endParaRPr dirty="0"/>
           </a:p>
         </p:txBody>
       </p:sp>
@@ -7575,7 +7576,7 @@
             </a:lvl9pPr>
           </a:lstStyle>
           <a:p>
-            <a:endParaRPr/>
+            <a:endParaRPr dirty="0"/>
           </a:p>
         </p:txBody>
       </p:sp>
@@ -7856,7 +7857,7 @@
               <a:rPr lang="es"/>
               <a:t>‹Nº›</a:t>
             </a:fld>
-            <a:endParaRPr/>
+            <a:endParaRPr dirty="0"/>
           </a:p>
         </p:txBody>
       </p:sp>
@@ -7940,7 +7941,7 @@
               <a:buFont typeface="Arial"/>
               <a:buNone/>
             </a:pPr>
-            <a:endParaRPr sz="1800" b="0" i="0" u="none" strike="noStrike" cap="none">
+            <a:endParaRPr sz="1800" b="0" i="0" u="none" strike="noStrike" cap="none" dirty="0">
               <a:solidFill>
                 <a:schemeClr val="lt1"/>
               </a:solidFill>
@@ -7994,7 +7995,7 @@
               <a:buFont typeface="Arial"/>
               <a:buNone/>
             </a:pPr>
-            <a:endParaRPr sz="3200" b="0" i="0" u="none" strike="noStrike" cap="none">
+            <a:endParaRPr sz="3200" b="0" i="0" u="none" strike="noStrike" cap="none" dirty="0">
               <a:solidFill>
                 <a:schemeClr val="dk1"/>
               </a:solidFill>
@@ -8212,7 +8213,7 @@
                 <a:buFont typeface="Arial"/>
                 <a:buNone/>
               </a:pPr>
-              <a:endParaRPr sz="1800" b="0" i="0" u="none" strike="noStrike" cap="none">
+              <a:endParaRPr sz="1800" b="0" i="0" u="none" strike="noStrike" cap="none" dirty="0">
                 <a:solidFill>
                   <a:schemeClr val="lt1"/>
                 </a:solidFill>
@@ -8321,7 +8322,7 @@
               <a:buFont typeface="Arial"/>
               <a:buNone/>
             </a:pPr>
-            <a:endParaRPr sz="3200" b="0" i="0" u="none" strike="noStrike" cap="none">
+            <a:endParaRPr sz="3200" b="0" i="0" u="none" strike="noStrike" cap="none" dirty="0">
               <a:solidFill>
                 <a:schemeClr val="dk1"/>
               </a:solidFill>
@@ -8597,7 +8598,7 @@
             </a:lvl9pPr>
           </a:lstStyle>
           <a:p>
-            <a:endParaRPr/>
+            <a:endParaRPr dirty="0"/>
           </a:p>
         </p:txBody>
       </p:sp>
@@ -8865,7 +8866,7 @@
             </a:lvl9pPr>
           </a:lstStyle>
           <a:p>
-            <a:endParaRPr/>
+            <a:endParaRPr dirty="0"/>
           </a:p>
         </p:txBody>
       </p:sp>
@@ -9146,7 +9147,7 @@
               <a:rPr lang="es"/>
               <a:t>‹Nº›</a:t>
             </a:fld>
-            <a:endParaRPr/>
+            <a:endParaRPr dirty="0"/>
           </a:p>
         </p:txBody>
       </p:sp>
@@ -9518,7 +9519,7 @@
             </a:lvl9pPr>
           </a:lstStyle>
           <a:p>
-            <a:endParaRPr/>
+            <a:endParaRPr dirty="0"/>
           </a:p>
         </p:txBody>
       </p:sp>
@@ -9786,7 +9787,7 @@
             </a:lvl9pPr>
           </a:lstStyle>
           <a:p>
-            <a:endParaRPr/>
+            <a:endParaRPr dirty="0"/>
           </a:p>
         </p:txBody>
       </p:sp>
@@ -10067,7 +10068,7 @@
               <a:rPr lang="es"/>
               <a:t>‹Nº›</a:t>
             </a:fld>
-            <a:endParaRPr/>
+            <a:endParaRPr dirty="0"/>
           </a:p>
         </p:txBody>
       </p:sp>
@@ -10157,7 +10158,7 @@
               <a:buFont typeface="Arial"/>
               <a:buNone/>
             </a:pPr>
-            <a:endParaRPr sz="1800" b="0" i="0" u="none" strike="noStrike" cap="none">
+            <a:endParaRPr sz="1800" b="0" i="0" u="none" strike="noStrike" cap="none" dirty="0">
               <a:solidFill>
                 <a:schemeClr val="lt1"/>
               </a:solidFill>
@@ -10211,7 +10212,7 @@
               <a:buFont typeface="Arial"/>
               <a:buNone/>
             </a:pPr>
-            <a:endParaRPr sz="3200" b="0" i="0" u="none" strike="noStrike" cap="none">
+            <a:endParaRPr sz="3200" b="0" i="0" u="none" strike="noStrike" cap="none" dirty="0">
               <a:solidFill>
                 <a:schemeClr val="dk1"/>
               </a:solidFill>
@@ -10593,7 +10594,7 @@
             </a:lvl9pPr>
           </a:lstStyle>
           <a:p>
-            <a:endParaRPr/>
+            <a:endParaRPr dirty="0"/>
           </a:p>
         </p:txBody>
       </p:sp>
@@ -10861,7 +10862,7 @@
             </a:lvl9pPr>
           </a:lstStyle>
           <a:p>
-            <a:endParaRPr/>
+            <a:endParaRPr dirty="0"/>
           </a:p>
         </p:txBody>
       </p:sp>
@@ -11142,7 +11143,7 @@
               <a:rPr lang="es"/>
               <a:t>‹Nº›</a:t>
             </a:fld>
-            <a:endParaRPr/>
+            <a:endParaRPr dirty="0"/>
           </a:p>
         </p:txBody>
       </p:sp>
@@ -11226,7 +11227,7 @@
               <a:buFont typeface="Arial"/>
               <a:buNone/>
             </a:pPr>
-            <a:endParaRPr sz="1800" b="0" i="0" u="none" strike="noStrike" cap="none">
+            <a:endParaRPr sz="1800" b="0" i="0" u="none" strike="noStrike" cap="none" dirty="0">
               <a:solidFill>
                 <a:schemeClr val="lt1"/>
               </a:solidFill>
@@ -11280,7 +11281,7 @@
               <a:buFont typeface="Arial"/>
               <a:buNone/>
             </a:pPr>
-            <a:endParaRPr sz="3200" b="0" i="0" u="none" strike="noStrike" cap="none">
+            <a:endParaRPr sz="3200" b="0" i="0" u="none" strike="noStrike" cap="none" dirty="0">
               <a:solidFill>
                 <a:schemeClr val="dk1"/>
               </a:solidFill>
@@ -11498,7 +11499,7 @@
                 <a:buFont typeface="Arial"/>
                 <a:buNone/>
               </a:pPr>
-              <a:endParaRPr sz="1800" b="0" i="0" u="none" strike="noStrike" cap="none">
+              <a:endParaRPr sz="1800" b="0" i="0" u="none" strike="noStrike" cap="none" dirty="0">
                 <a:solidFill>
                   <a:schemeClr val="lt1"/>
                 </a:solidFill>
@@ -11607,7 +11608,7 @@
               <a:buFont typeface="Arial"/>
               <a:buNone/>
             </a:pPr>
-            <a:endParaRPr sz="3200" b="0" i="0" u="none" strike="noStrike" cap="none">
+            <a:endParaRPr sz="3200" b="0" i="0" u="none" strike="noStrike" cap="none" dirty="0">
               <a:solidFill>
                 <a:schemeClr val="dk1"/>
               </a:solidFill>
@@ -11883,7 +11884,7 @@
             </a:lvl9pPr>
           </a:lstStyle>
           <a:p>
-            <a:endParaRPr/>
+            <a:endParaRPr dirty="0"/>
           </a:p>
         </p:txBody>
       </p:sp>
@@ -12151,7 +12152,7 @@
             </a:lvl9pPr>
           </a:lstStyle>
           <a:p>
-            <a:endParaRPr/>
+            <a:endParaRPr dirty="0"/>
           </a:p>
         </p:txBody>
       </p:sp>
@@ -12432,7 +12433,7 @@
               <a:rPr lang="es"/>
               <a:t>‹Nº›</a:t>
             </a:fld>
-            <a:endParaRPr/>
+            <a:endParaRPr dirty="0"/>
           </a:p>
         </p:txBody>
       </p:sp>
@@ -12752,7 +12753,7 @@
             </a:lvl9pPr>
           </a:lstStyle>
           <a:p>
-            <a:endParaRPr/>
+            <a:endParaRPr dirty="0"/>
           </a:p>
         </p:txBody>
       </p:sp>
@@ -13020,7 +13021,7 @@
             </a:lvl9pPr>
           </a:lstStyle>
           <a:p>
-            <a:endParaRPr/>
+            <a:endParaRPr dirty="0"/>
           </a:p>
         </p:txBody>
       </p:sp>
@@ -13301,7 +13302,7 @@
               <a:rPr lang="es"/>
               <a:t>‹Nº›</a:t>
             </a:fld>
-            <a:endParaRPr/>
+            <a:endParaRPr dirty="0"/>
           </a:p>
         </p:txBody>
       </p:sp>
@@ -13391,7 +13392,7 @@
               <a:buFont typeface="Arial"/>
               <a:buNone/>
             </a:pPr>
-            <a:endParaRPr sz="1800" b="0" i="0" u="none" strike="noStrike" cap="none">
+            <a:endParaRPr sz="1800" b="0" i="0" u="none" strike="noStrike" cap="none" dirty="0">
               <a:solidFill>
                 <a:schemeClr val="lt1"/>
               </a:solidFill>
@@ -13445,7 +13446,7 @@
               <a:buFont typeface="Arial"/>
               <a:buNone/>
             </a:pPr>
-            <a:endParaRPr sz="3200" b="0" i="0" u="none" strike="noStrike" cap="none">
+            <a:endParaRPr sz="3200" b="0" i="0" u="none" strike="noStrike" cap="none" dirty="0">
               <a:solidFill>
                 <a:schemeClr val="dk1"/>
               </a:solidFill>
@@ -13827,7 +13828,7 @@
             </a:lvl9pPr>
           </a:lstStyle>
           <a:p>
-            <a:endParaRPr/>
+            <a:endParaRPr dirty="0"/>
           </a:p>
         </p:txBody>
       </p:sp>
@@ -14095,7 +14096,7 @@
             </a:lvl9pPr>
           </a:lstStyle>
           <a:p>
-            <a:endParaRPr/>
+            <a:endParaRPr dirty="0"/>
           </a:p>
         </p:txBody>
       </p:sp>
@@ -14376,7 +14377,7 @@
               <a:rPr lang="es"/>
               <a:t>‹Nº›</a:t>
             </a:fld>
-            <a:endParaRPr/>
+            <a:endParaRPr dirty="0"/>
           </a:p>
         </p:txBody>
       </p:sp>
@@ -14460,7 +14461,7 @@
               <a:buFont typeface="Arial"/>
               <a:buNone/>
             </a:pPr>
-            <a:endParaRPr sz="1800" b="0" i="0" u="none" strike="noStrike" cap="none">
+            <a:endParaRPr sz="1800" b="0" i="0" u="none" strike="noStrike" cap="none" dirty="0">
               <a:solidFill>
                 <a:schemeClr val="lt1"/>
               </a:solidFill>
@@ -14514,7 +14515,7 @@
               <a:buFont typeface="Arial"/>
               <a:buNone/>
             </a:pPr>
-            <a:endParaRPr sz="3200" b="0" i="0" u="none" strike="noStrike" cap="none">
+            <a:endParaRPr sz="3200" b="0" i="0" u="none" strike="noStrike" cap="none" dirty="0">
               <a:solidFill>
                 <a:schemeClr val="dk1"/>
               </a:solidFill>
@@ -15058,7 +15059,7 @@
               </a:rPr>
               <a:t>GC-F-004 V.01</a:t>
             </a:r>
-            <a:endParaRPr sz="1400" b="0" i="0" u="none" strike="noStrike" cap="none">
+            <a:endParaRPr sz="1400" b="0" i="0" u="none" strike="noStrike" cap="none" dirty="0">
               <a:solidFill>
                 <a:srgbClr val="000000"/>
               </a:solidFill>
@@ -15105,7 +15106,7 @@
         <p:push dir="r"/>
       </p:transition>
     </mc:Choice>
-    <mc:Fallback xmlns="" xmlns:mv="urn:schemas-microsoft-com:mac:vml" xmlns:c="http://schemas.openxmlformats.org/drawingml/2006/chart" xmlns:dgm="http://schemas.openxmlformats.org/drawingml/2006/diagram" xmlns:o="urn:schemas-microsoft-com:office:office" xmlns:v="urn:schemas-microsoft-com:vml" xmlns:pvml="urn:schemas-microsoft-com:office:powerpoint" xmlns:com="http://schemas.openxmlformats.org/drawingml/2006/compatibility" xmlns:p15="http://schemas.microsoft.com/office/powerpoint/2012/main">
+    <mc:Fallback xmlns:p15="http://schemas.microsoft.com/office/powerpoint/2012/main" xmlns:com="http://schemas.openxmlformats.org/drawingml/2006/compatibility" xmlns:pvml="urn:schemas-microsoft-com:office:powerpoint" xmlns:v="urn:schemas-microsoft-com:vml" xmlns:o="urn:schemas-microsoft-com:office:office" xmlns:dgm="http://schemas.openxmlformats.org/drawingml/2006/diagram" xmlns:c="http://schemas.openxmlformats.org/drawingml/2006/chart" xmlns:mv="urn:schemas-microsoft-com:mac:vml" xmlns="">
       <p:transition spd="slow">
         <p:fade/>
       </p:transition>
@@ -16123,7 +16124,7 @@
                 <a:cs typeface="Calibri"/>
                 <a:sym typeface="Calibri"/>
               </a:rPr>
-              <a:t>Junio 2020</a:t>
+              <a:t>Julio 2020</a:t>
             </a:r>
             <a:endParaRPr sz="1400" b="1" i="0" u="none" strike="noStrike" cap="none" dirty="0">
               <a:solidFill>
@@ -16263,7 +16264,7 @@
               <a:buFont typeface="Calibri"/>
               <a:buNone/>
             </a:pPr>
-            <a:endParaRPr sz="3000" b="1" i="0" u="none" strike="noStrike" cap="none">
+            <a:endParaRPr sz="3000" b="1" i="0" u="none" strike="noStrike" cap="none" dirty="0">
               <a:solidFill>
                 <a:schemeClr val="lt1"/>
               </a:solidFill>
@@ -16527,6 +16528,28 @@
                 <a:sym typeface="Times New Roman"/>
               </a:rPr>
               <a:t> Buitrago</a:t>
+            </a:r>
+          </a:p>
+          <a:p>
+            <a:pPr marL="457200" lvl="0" indent="-342900" algn="l" rtl="0">
+              <a:spcBef>
+                <a:spcPts val="0"/>
+              </a:spcBef>
+              <a:spcAft>
+                <a:spcPts val="0"/>
+              </a:spcAft>
+              <a:buSzPts val="1800"/>
+              <a:buFont typeface="Times New Roman"/>
+              <a:buChar char="●"/>
+            </a:pPr>
+            <a:r>
+              <a:rPr lang="es" sz="2000" dirty="0">
+                <a:latin typeface="Times New Roman"/>
+                <a:ea typeface="Times New Roman"/>
+                <a:cs typeface="Times New Roman"/>
+                <a:sym typeface="Times New Roman"/>
+              </a:rPr>
+              <a:t>Duvan Molina</a:t>
             </a:r>
             <a:endParaRPr sz="2000" dirty="0">
               <a:latin typeface="Times New Roman"/>
@@ -16606,7 +16629,7 @@
         </p:nvSpPr>
         <p:spPr>
           <a:xfrm>
-            <a:off x="2362000" y="76200"/>
+            <a:off x="2414763" y="54789"/>
             <a:ext cx="4688100" cy="879600"/>
           </a:xfrm>
           <a:prstGeom prst="rect">
@@ -16657,7 +16680,7 @@
                 <a:cs typeface="Times New Roman"/>
                 <a:sym typeface="Times New Roman"/>
               </a:rPr>
-              <a:t>Objetivo General</a:t>
+              <a:t>Objetivos</a:t>
             </a:r>
             <a:endParaRPr sz="3000" b="1" i="0" u="none" strike="noStrike" cap="none" dirty="0">
               <a:solidFill>
@@ -16686,7 +16709,7 @@
         <p:spPr>
           <a:xfrm>
             <a:off x="303000" y="771525"/>
-            <a:ext cx="7920000" cy="4320000"/>
+            <a:ext cx="7920000" cy="3593998"/>
           </a:xfrm>
           <a:prstGeom prst="rect">
             <a:avLst/>
@@ -16740,7 +16763,136 @@
               </a:rPr>
               <a:t>Diseñar un aplicativo web para solucionar los problemas de comunicación en la tienda de videojuegos del barrio Diana Turbay.</a:t>
             </a:r>
-            <a:endParaRPr sz="2000" dirty="0">
+          </a:p>
+          <a:p>
+            <a:pPr marL="0" lvl="0" indent="0" algn="just" rtl="0">
+              <a:lnSpc>
+                <a:spcPct val="115000"/>
+              </a:lnSpc>
+              <a:spcBef>
+                <a:spcPts val="0"/>
+              </a:spcBef>
+              <a:spcAft>
+                <a:spcPts val="0"/>
+              </a:spcAft>
+              <a:buNone/>
+            </a:pPr>
+            <a:endParaRPr lang="es" sz="2000" dirty="0">
+              <a:latin typeface="Times New Roman"/>
+              <a:ea typeface="Times New Roman"/>
+              <a:cs typeface="Times New Roman"/>
+              <a:sym typeface="Times New Roman"/>
+            </a:endParaRPr>
+          </a:p>
+          <a:p>
+            <a:pPr marL="0" lvl="0" indent="0" algn="just" rtl="0">
+              <a:lnSpc>
+                <a:spcPct val="115000"/>
+              </a:lnSpc>
+              <a:spcBef>
+                <a:spcPts val="0"/>
+              </a:spcBef>
+              <a:spcAft>
+                <a:spcPts val="0"/>
+              </a:spcAft>
+              <a:buNone/>
+            </a:pPr>
+            <a:r>
+              <a:rPr lang="es" sz="2000" b="1" dirty="0">
+                <a:latin typeface="Times New Roman"/>
+                <a:ea typeface="Georgia"/>
+                <a:cs typeface="Times New Roman"/>
+                <a:sym typeface="Times New Roman"/>
+              </a:rPr>
+              <a:t>Objetivos Especificos:</a:t>
+            </a:r>
+          </a:p>
+          <a:p>
+            <a:pPr marL="457200" lvl="0" indent="-342900" algn="just">
+              <a:lnSpc>
+                <a:spcPct val="115000"/>
+              </a:lnSpc>
+              <a:buSzPts val="1800"/>
+              <a:buFont typeface="Times New Roman"/>
+              <a:buAutoNum type="arabicPeriod"/>
+            </a:pPr>
+            <a:r>
+              <a:rPr lang="es-MX" sz="2000" dirty="0">
+                <a:solidFill>
+                  <a:schemeClr val="dk1"/>
+                </a:solidFill>
+                <a:latin typeface="Times New Roman"/>
+                <a:ea typeface="Times New Roman"/>
+                <a:cs typeface="Times New Roman"/>
+                <a:sym typeface="Times New Roman"/>
+              </a:rPr>
+              <a:t>Sugerir al cliente los horarios de disponibilidad. </a:t>
+            </a:r>
+            <a:endParaRPr lang="es-MX" sz="2000" dirty="0">
+              <a:latin typeface="Times New Roman"/>
+              <a:ea typeface="Times New Roman"/>
+              <a:cs typeface="Times New Roman"/>
+              <a:sym typeface="Times New Roman"/>
+            </a:endParaRPr>
+          </a:p>
+          <a:p>
+            <a:pPr marL="457200" lvl="0" indent="-342900" algn="just">
+              <a:lnSpc>
+                <a:spcPct val="115000"/>
+              </a:lnSpc>
+              <a:buSzPts val="1800"/>
+              <a:buFont typeface="Times New Roman"/>
+              <a:buAutoNum type="arabicPeriod"/>
+            </a:pPr>
+            <a:r>
+              <a:rPr lang="es-MX" sz="2000" dirty="0">
+                <a:latin typeface="Times New Roman"/>
+                <a:ea typeface="Times New Roman"/>
+                <a:cs typeface="Times New Roman"/>
+                <a:sym typeface="Times New Roman"/>
+              </a:rPr>
+              <a:t>Permitir al cliente agendar citas desde un dispositivo.</a:t>
+            </a:r>
+          </a:p>
+          <a:p>
+            <a:pPr marL="457200" lvl="0" indent="-342900" algn="just">
+              <a:lnSpc>
+                <a:spcPct val="115000"/>
+              </a:lnSpc>
+              <a:buSzPts val="1800"/>
+              <a:buFont typeface="Times New Roman"/>
+              <a:buAutoNum type="arabicPeriod"/>
+            </a:pPr>
+            <a:r>
+              <a:rPr lang="es-MX" sz="2000" dirty="0">
+                <a:latin typeface="Times New Roman"/>
+                <a:ea typeface="Times New Roman"/>
+                <a:cs typeface="Times New Roman"/>
+                <a:sym typeface="Times New Roman"/>
+              </a:rPr>
+              <a:t>Promocionar los productos disponibles en el local desde el aplicativo web.</a:t>
+            </a:r>
+            <a:endParaRPr lang="es-MX" sz="1800" dirty="0">
+              <a:latin typeface="Times New Roman"/>
+              <a:ea typeface="Times New Roman"/>
+              <a:cs typeface="Times New Roman"/>
+              <a:sym typeface="Times New Roman"/>
+            </a:endParaRPr>
+          </a:p>
+          <a:p>
+            <a:pPr marL="0" lvl="0" indent="0" algn="just" rtl="0">
+              <a:lnSpc>
+                <a:spcPct val="115000"/>
+              </a:lnSpc>
+              <a:spcBef>
+                <a:spcPts val="0"/>
+              </a:spcBef>
+              <a:spcAft>
+                <a:spcPts val="0"/>
+              </a:spcAft>
+              <a:buNone/>
+            </a:pPr>
+            <a:endParaRPr sz="2000" b="1" dirty="0">
               <a:latin typeface="Georgia"/>
               <a:ea typeface="Georgia"/>
               <a:cs typeface="Georgia"/>
@@ -16749,42 +16901,6 @@
           </a:p>
         </p:txBody>
       </p:sp>
-      <p:pic>
-        <p:nvPicPr>
-          <p:cNvPr id="4" name="Imagen 3">
-            <a:extLst>
-              <a:ext uri="{FF2B5EF4-FFF2-40B4-BE49-F238E27FC236}">
-                <a16:creationId xmlns:a16="http://schemas.microsoft.com/office/drawing/2014/main" id="{DB84B6A1-84C6-406B-979E-D9EE2ED717D9}"/>
-              </a:ext>
-            </a:extLst>
-          </p:cNvPr>
-          <p:cNvPicPr>
-            <a:picLocks noChangeAspect="1"/>
-          </p:cNvPicPr>
-          <p:nvPr/>
-        </p:nvPicPr>
-        <p:blipFill>
-          <a:blip r:embed="rId3">
-            <a:extLst>
-              <a:ext uri="{28A0092B-C50C-407E-A947-70E740481C1C}">
-                <a14:useLocalDpi xmlns:a14="http://schemas.microsoft.com/office/drawing/2010/main" val="0"/>
-              </a:ext>
-            </a:extLst>
-          </a:blip>
-          <a:stretch>
-            <a:fillRect/>
-          </a:stretch>
-        </p:blipFill>
-        <p:spPr>
-          <a:xfrm>
-            <a:off x="2052239" y="2199861"/>
-            <a:ext cx="4117381" cy="2080591"/>
-          </a:xfrm>
-          <a:prstGeom prst="rect">
-            <a:avLst/>
-          </a:prstGeom>
-        </p:spPr>
-      </p:pic>
     </p:spTree>
   </p:cSld>
   <p:clrMapOvr>
@@ -16852,7 +16968,7 @@
               <a:buFont typeface="Arial"/>
               <a:buNone/>
             </a:pPr>
-            <a:endParaRPr sz="1400" b="0" i="0" u="none" strike="noStrike" cap="none">
+            <a:endParaRPr sz="1400" b="0" i="0" u="none" strike="noStrike" cap="none" dirty="0">
               <a:solidFill>
                 <a:srgbClr val="000000"/>
               </a:solidFill>
@@ -16929,7 +17045,7 @@
                 <a:cs typeface="Times New Roman"/>
                 <a:sym typeface="Times New Roman"/>
               </a:rPr>
-              <a:t>Objetivos Específicos</a:t>
+              <a:t>Requerimientos</a:t>
             </a:r>
             <a:endParaRPr sz="1400" i="0" u="none" strike="noStrike" cap="none" dirty="0">
               <a:solidFill>
@@ -16974,7 +17090,7 @@
           </a:bodyPr>
           <a:lstStyle/>
           <a:p>
-            <a:pPr marL="457200" lvl="0" indent="-342900" algn="just" rtl="0">
+            <a:pPr marL="457200" lvl="0" indent="0" algn="l" rtl="0">
               <a:lnSpc>
                 <a:spcPct val="115000"/>
               </a:lnSpc>
@@ -16984,31 +17100,20 @@
               <a:spcAft>
                 <a:spcPts val="0"/>
               </a:spcAft>
-              <a:buSzPts val="1800"/>
-              <a:buFont typeface="Times New Roman"/>
-              <a:buAutoNum type="arabicPeriod"/>
+              <a:buNone/>
             </a:pPr>
             <a:r>
-              <a:rPr lang="es" sz="2000" dirty="0">
-                <a:solidFill>
-                  <a:schemeClr val="dk1"/>
-                </a:solidFill>
+              <a:rPr lang="es-CO" sz="2000" b="1" dirty="0">
                 <a:latin typeface="Times New Roman"/>
                 <a:ea typeface="Times New Roman"/>
                 <a:cs typeface="Times New Roman"/>
                 <a:sym typeface="Times New Roman"/>
               </a:rPr>
-              <a:t>Sugerir al cliente los horarios de disponibilidad. </a:t>
+              <a:t>Funcionales:</a:t>
             </a:r>
-            <a:endParaRPr sz="2000" dirty="0">
-              <a:latin typeface="Times New Roman"/>
-              <a:ea typeface="Times New Roman"/>
-              <a:cs typeface="Times New Roman"/>
-              <a:sym typeface="Times New Roman"/>
-            </a:endParaRPr>
           </a:p>
           <a:p>
-            <a:pPr marL="457200" lvl="0" indent="-342900" algn="just" rtl="0">
+            <a:pPr marL="457200" lvl="0" indent="0" algn="l" rtl="0">
               <a:lnSpc>
                 <a:spcPct val="115000"/>
               </a:lnSpc>
@@ -17018,56 +17123,26 @@
               <a:spcAft>
                 <a:spcPts val="0"/>
               </a:spcAft>
-              <a:buSzPts val="1800"/>
-              <a:buFont typeface="Times New Roman"/>
-              <a:buAutoNum type="arabicPeriod"/>
+              <a:buNone/>
             </a:pPr>
             <a:r>
-              <a:rPr lang="es" sz="2000" dirty="0">
+              <a:rPr lang="es-CO" sz="2000" b="1" dirty="0">
                 <a:latin typeface="Times New Roman"/>
                 <a:ea typeface="Times New Roman"/>
                 <a:cs typeface="Times New Roman"/>
                 <a:sym typeface="Times New Roman"/>
               </a:rPr>
-              <a:t>Permitir al cliente agendar citas desde un dispositivo.</a:t>
+              <a:t>	1. </a:t>
             </a:r>
-            <a:endParaRPr sz="2000" dirty="0">
-              <a:latin typeface="Times New Roman"/>
-              <a:ea typeface="Times New Roman"/>
-              <a:cs typeface="Times New Roman"/>
-              <a:sym typeface="Times New Roman"/>
-            </a:endParaRPr>
-          </a:p>
-          <a:p>
-            <a:pPr marL="457200" lvl="0" indent="-342900" algn="just" rtl="0">
-              <a:lnSpc>
-                <a:spcPct val="115000"/>
-              </a:lnSpc>
-              <a:spcBef>
-                <a:spcPts val="0"/>
-              </a:spcBef>
-              <a:spcAft>
-                <a:spcPts val="0"/>
-              </a:spcAft>
-              <a:buSzPts val="1800"/>
-              <a:buFont typeface="Times New Roman"/>
-              <a:buAutoNum type="arabicPeriod"/>
-            </a:pPr>
             <a:r>
-              <a:rPr lang="es" sz="2000" dirty="0">
+              <a:rPr lang="es-CO" sz="2000" dirty="0">
                 <a:latin typeface="Times New Roman"/>
                 <a:ea typeface="Times New Roman"/>
                 <a:cs typeface="Times New Roman"/>
                 <a:sym typeface="Times New Roman"/>
               </a:rPr>
-              <a:t>Promocionar los productos disponibles en el local desde el aplicativo web.</a:t>
+              <a:t>Crear cuenta administrador.</a:t>
             </a:r>
-            <a:endParaRPr sz="1800" dirty="0">
-              <a:latin typeface="Times New Roman"/>
-              <a:ea typeface="Times New Roman"/>
-              <a:cs typeface="Times New Roman"/>
-              <a:sym typeface="Times New Roman"/>
-            </a:endParaRPr>
           </a:p>
           <a:p>
             <a:pPr marL="457200" lvl="0" indent="0" algn="l" rtl="0">
@@ -17082,7 +17157,295 @@
               </a:spcAft>
               <a:buNone/>
             </a:pPr>
-            <a:endParaRPr dirty="0">
+            <a:r>
+              <a:rPr lang="es-CO" sz="2000" b="1" dirty="0">
+                <a:latin typeface="Times New Roman"/>
+                <a:ea typeface="Times New Roman"/>
+                <a:cs typeface="Times New Roman"/>
+                <a:sym typeface="Times New Roman"/>
+              </a:rPr>
+              <a:t>	2. </a:t>
+            </a:r>
+            <a:r>
+              <a:rPr lang="es-CO" sz="2000" dirty="0">
+                <a:latin typeface="Times New Roman"/>
+                <a:ea typeface="Times New Roman"/>
+                <a:cs typeface="Times New Roman"/>
+                <a:sym typeface="Times New Roman"/>
+              </a:rPr>
+              <a:t>Reportes.</a:t>
+            </a:r>
+          </a:p>
+          <a:p>
+            <a:pPr marL="457200" lvl="0" indent="0" algn="l" rtl="0">
+              <a:lnSpc>
+                <a:spcPct val="115000"/>
+              </a:lnSpc>
+              <a:spcBef>
+                <a:spcPts val="0"/>
+              </a:spcBef>
+              <a:spcAft>
+                <a:spcPts val="0"/>
+              </a:spcAft>
+              <a:buNone/>
+            </a:pPr>
+            <a:r>
+              <a:rPr lang="es-CO" sz="2000" b="1" dirty="0">
+                <a:latin typeface="Times New Roman"/>
+                <a:ea typeface="Times New Roman"/>
+                <a:cs typeface="Times New Roman"/>
+                <a:sym typeface="Times New Roman"/>
+              </a:rPr>
+              <a:t>	3. </a:t>
+            </a:r>
+            <a:r>
+              <a:rPr lang="es-CO" sz="2000" dirty="0">
+                <a:latin typeface="Times New Roman"/>
+                <a:ea typeface="Times New Roman"/>
+                <a:cs typeface="Times New Roman"/>
+                <a:sym typeface="Times New Roman"/>
+              </a:rPr>
+              <a:t>Asignación de citas.</a:t>
+            </a:r>
+          </a:p>
+          <a:p>
+            <a:pPr marL="457200" lvl="0" indent="0" algn="l" rtl="0">
+              <a:lnSpc>
+                <a:spcPct val="115000"/>
+              </a:lnSpc>
+              <a:spcBef>
+                <a:spcPts val="0"/>
+              </a:spcBef>
+              <a:spcAft>
+                <a:spcPts val="0"/>
+              </a:spcAft>
+              <a:buNone/>
+            </a:pPr>
+            <a:r>
+              <a:rPr lang="es-CO" sz="2000" b="1" dirty="0">
+                <a:latin typeface="Times New Roman"/>
+                <a:ea typeface="Times New Roman"/>
+                <a:cs typeface="Times New Roman"/>
+                <a:sym typeface="Times New Roman"/>
+              </a:rPr>
+              <a:t>	4. </a:t>
+            </a:r>
+            <a:r>
+              <a:rPr lang="es-CO" sz="2000" dirty="0">
+                <a:latin typeface="Times New Roman"/>
+                <a:ea typeface="Times New Roman"/>
+                <a:cs typeface="Times New Roman"/>
+                <a:sym typeface="Times New Roman"/>
+              </a:rPr>
+              <a:t>Administrar usuarios (CRUD)</a:t>
+            </a:r>
+          </a:p>
+          <a:p>
+            <a:pPr marL="457200" lvl="0" indent="0" algn="l" rtl="0">
+              <a:lnSpc>
+                <a:spcPct val="115000"/>
+              </a:lnSpc>
+              <a:spcBef>
+                <a:spcPts val="0"/>
+              </a:spcBef>
+              <a:spcAft>
+                <a:spcPts val="0"/>
+              </a:spcAft>
+              <a:buNone/>
+            </a:pPr>
+            <a:r>
+              <a:rPr lang="es-CO" sz="2000" b="1" dirty="0">
+                <a:latin typeface="Times New Roman"/>
+                <a:ea typeface="Times New Roman"/>
+                <a:cs typeface="Times New Roman"/>
+                <a:sym typeface="Times New Roman"/>
+              </a:rPr>
+              <a:t>	5. </a:t>
+            </a:r>
+            <a:r>
+              <a:rPr lang="es-CO" sz="2000" dirty="0">
+                <a:latin typeface="Times New Roman"/>
+                <a:ea typeface="Times New Roman"/>
+                <a:cs typeface="Times New Roman"/>
+                <a:sym typeface="Times New Roman"/>
+              </a:rPr>
+              <a:t>Cuenta usuario.</a:t>
+            </a:r>
+          </a:p>
+          <a:p>
+            <a:pPr marL="457200" lvl="0" indent="0" algn="l" rtl="0">
+              <a:lnSpc>
+                <a:spcPct val="115000"/>
+              </a:lnSpc>
+              <a:spcBef>
+                <a:spcPts val="0"/>
+              </a:spcBef>
+              <a:spcAft>
+                <a:spcPts val="0"/>
+              </a:spcAft>
+              <a:buNone/>
+            </a:pPr>
+            <a:r>
+              <a:rPr lang="es-CO" sz="2000" b="1" dirty="0">
+                <a:latin typeface="Times New Roman"/>
+                <a:ea typeface="Times New Roman"/>
+                <a:cs typeface="Times New Roman"/>
+                <a:sym typeface="Times New Roman"/>
+              </a:rPr>
+              <a:t>	6. </a:t>
+            </a:r>
+            <a:r>
+              <a:rPr lang="es-CO" sz="2000" dirty="0">
+                <a:latin typeface="Times New Roman"/>
+                <a:ea typeface="Times New Roman"/>
+                <a:cs typeface="Times New Roman"/>
+                <a:sym typeface="Times New Roman"/>
+              </a:rPr>
+              <a:t>Consulta y verificación (HORARIOS-DISPONIBILIDAD).</a:t>
+            </a:r>
+          </a:p>
+          <a:p>
+            <a:pPr marL="457200" lvl="0" indent="0" algn="l" rtl="0">
+              <a:lnSpc>
+                <a:spcPct val="115000"/>
+              </a:lnSpc>
+              <a:spcBef>
+                <a:spcPts val="0"/>
+              </a:spcBef>
+              <a:spcAft>
+                <a:spcPts val="0"/>
+              </a:spcAft>
+              <a:buNone/>
+            </a:pPr>
+            <a:r>
+              <a:rPr lang="es-CO" sz="2000" b="1" dirty="0">
+                <a:latin typeface="Times New Roman"/>
+                <a:ea typeface="Times New Roman"/>
+                <a:cs typeface="Times New Roman"/>
+                <a:sym typeface="Times New Roman"/>
+              </a:rPr>
+              <a:t>	7.  </a:t>
+            </a:r>
+            <a:r>
+              <a:rPr lang="es-CO" sz="2000" dirty="0">
+                <a:latin typeface="Times New Roman"/>
+                <a:ea typeface="Times New Roman"/>
+                <a:cs typeface="Times New Roman"/>
+                <a:sym typeface="Times New Roman"/>
+              </a:rPr>
+              <a:t>Modo espectador.</a:t>
+            </a:r>
+          </a:p>
+          <a:p>
+            <a:pPr marL="457200" lvl="0" indent="0" algn="l" rtl="0">
+              <a:lnSpc>
+                <a:spcPct val="115000"/>
+              </a:lnSpc>
+              <a:spcBef>
+                <a:spcPts val="0"/>
+              </a:spcBef>
+              <a:spcAft>
+                <a:spcPts val="0"/>
+              </a:spcAft>
+              <a:buNone/>
+            </a:pPr>
+            <a:r>
+              <a:rPr lang="es-CO" sz="2000" b="1" dirty="0">
+                <a:latin typeface="Times New Roman"/>
+                <a:ea typeface="Times New Roman"/>
+                <a:cs typeface="Times New Roman"/>
+                <a:sym typeface="Times New Roman"/>
+              </a:rPr>
+              <a:t>	8. </a:t>
+            </a:r>
+            <a:r>
+              <a:rPr lang="es-CO" sz="2000" dirty="0">
+                <a:latin typeface="Times New Roman"/>
+                <a:ea typeface="Times New Roman"/>
+                <a:cs typeface="Times New Roman"/>
+                <a:sym typeface="Times New Roman"/>
+              </a:rPr>
+              <a:t>Ofertas (PRODUCTOS-SERVICIOS).</a:t>
+            </a:r>
+          </a:p>
+          <a:p>
+            <a:pPr marL="457200" lvl="0" indent="0" algn="l" rtl="0">
+              <a:lnSpc>
+                <a:spcPct val="115000"/>
+              </a:lnSpc>
+              <a:spcBef>
+                <a:spcPts val="0"/>
+              </a:spcBef>
+              <a:spcAft>
+                <a:spcPts val="0"/>
+              </a:spcAft>
+              <a:buNone/>
+            </a:pPr>
+            <a:r>
+              <a:rPr lang="es-CO" sz="2000" b="1" dirty="0">
+                <a:latin typeface="Times New Roman"/>
+                <a:ea typeface="Times New Roman"/>
+                <a:cs typeface="Times New Roman"/>
+                <a:sym typeface="Times New Roman"/>
+              </a:rPr>
+              <a:t>	9. </a:t>
+            </a:r>
+            <a:r>
+              <a:rPr lang="es-CO" sz="2000" dirty="0">
+                <a:latin typeface="Times New Roman"/>
+                <a:ea typeface="Times New Roman"/>
+                <a:cs typeface="Times New Roman"/>
+                <a:sym typeface="Times New Roman"/>
+              </a:rPr>
+              <a:t>Catálogo juegos.</a:t>
+            </a:r>
+          </a:p>
+          <a:p>
+            <a:pPr marL="457200" lvl="0" indent="0" algn="l" rtl="0">
+              <a:lnSpc>
+                <a:spcPct val="115000"/>
+              </a:lnSpc>
+              <a:spcBef>
+                <a:spcPts val="0"/>
+              </a:spcBef>
+              <a:spcAft>
+                <a:spcPts val="0"/>
+              </a:spcAft>
+              <a:buNone/>
+            </a:pPr>
+            <a:r>
+              <a:rPr lang="es-CO" sz="2000" b="1" dirty="0">
+                <a:latin typeface="Times New Roman"/>
+                <a:ea typeface="Times New Roman"/>
+                <a:cs typeface="Times New Roman"/>
+                <a:sym typeface="Times New Roman"/>
+              </a:rPr>
+              <a:t>	10. </a:t>
+            </a:r>
+            <a:r>
+              <a:rPr lang="es-CO" sz="2000" dirty="0">
+                <a:latin typeface="Times New Roman"/>
+                <a:ea typeface="Times New Roman"/>
+                <a:cs typeface="Times New Roman"/>
+                <a:sym typeface="Times New Roman"/>
+              </a:rPr>
+              <a:t>Precios (PRODUCTOS-SERVICIOS).</a:t>
+            </a:r>
+          </a:p>
+          <a:p>
+            <a:pPr marL="457200" lvl="0" indent="0" algn="l" rtl="0">
+              <a:lnSpc>
+                <a:spcPct val="115000"/>
+              </a:lnSpc>
+              <a:spcBef>
+                <a:spcPts val="0"/>
+              </a:spcBef>
+              <a:spcAft>
+                <a:spcPts val="0"/>
+              </a:spcAft>
+              <a:buNone/>
+            </a:pPr>
+            <a:endParaRPr lang="es-CO" b="1" dirty="0">
               <a:latin typeface="Times New Roman"/>
               <a:ea typeface="Times New Roman"/>
               <a:cs typeface="Times New Roman"/>
@@ -17091,42 +17454,6 @@
           </a:p>
         </p:txBody>
       </p:sp>
-      <p:pic>
-        <p:nvPicPr>
-          <p:cNvPr id="5" name="Imagen 4">
-            <a:extLst>
-              <a:ext uri="{FF2B5EF4-FFF2-40B4-BE49-F238E27FC236}">
-                <a16:creationId xmlns:a16="http://schemas.microsoft.com/office/drawing/2014/main" id="{995D774E-1BAC-49BF-8DC5-6844A2BD1B76}"/>
-              </a:ext>
-            </a:extLst>
-          </p:cNvPr>
-          <p:cNvPicPr>
-            <a:picLocks noChangeAspect="1"/>
-          </p:cNvPicPr>
-          <p:nvPr/>
-        </p:nvPicPr>
-        <p:blipFill>
-          <a:blip r:embed="rId3">
-            <a:extLst>
-              <a:ext uri="{28A0092B-C50C-407E-A947-70E740481C1C}">
-                <a14:useLocalDpi xmlns:a14="http://schemas.microsoft.com/office/drawing/2010/main" val="0"/>
-              </a:ext>
-            </a:extLst>
-          </a:blip>
-          <a:stretch>
-            <a:fillRect/>
-          </a:stretch>
-        </p:blipFill>
-        <p:spPr>
-          <a:xfrm>
-            <a:off x="2680615" y="2928688"/>
-            <a:ext cx="2573871" cy="1929192"/>
-          </a:xfrm>
-          <a:prstGeom prst="rect">
-            <a:avLst/>
-          </a:prstGeom>
-        </p:spPr>
-      </p:pic>
     </p:spTree>
   </p:cSld>
   <p:clrMapOvr>
@@ -17152,42 +17479,12 @@
           <a:chExt cx="0" cy="0"/>
         </a:xfrm>
       </p:grpSpPr>
-      <p:pic>
-        <p:nvPicPr>
-          <p:cNvPr id="3" name="Imagen 2">
+      <p:sp>
+        <p:nvSpPr>
+          <p:cNvPr id="3" name="Google Shape;233;p43">
             <a:extLst>
               <a:ext uri="{FF2B5EF4-FFF2-40B4-BE49-F238E27FC236}">
-                <a16:creationId xmlns:a16="http://schemas.microsoft.com/office/drawing/2014/main" id="{1BEC750D-4337-4131-88FE-136A1BD7E6B9}"/>
-              </a:ext>
-            </a:extLst>
-          </p:cNvPr>
-          <p:cNvPicPr>
-            <a:picLocks noChangeAspect="1"/>
-          </p:cNvPicPr>
-          <p:nvPr/>
-        </p:nvPicPr>
-        <p:blipFill>
-          <a:blip r:embed="rId2"/>
-          <a:stretch>
-            <a:fillRect/>
-          </a:stretch>
-        </p:blipFill>
-        <p:spPr>
-          <a:xfrm>
-            <a:off x="1071716" y="1188614"/>
-            <a:ext cx="6857999" cy="3647962"/>
-          </a:xfrm>
-          <a:prstGeom prst="rect">
-            <a:avLst/>
-          </a:prstGeom>
-        </p:spPr>
-      </p:pic>
-      <p:sp>
-        <p:nvSpPr>
-          <p:cNvPr id="4" name="Google Shape;233;p43">
-            <a:extLst>
-              <a:ext uri="{FF2B5EF4-FFF2-40B4-BE49-F238E27FC236}">
-                <a16:creationId xmlns:a16="http://schemas.microsoft.com/office/drawing/2014/main" id="{E3D2DB7C-4414-41DF-B3B4-E40D7C7BF93D}"/>
+                <a16:creationId xmlns:a16="http://schemas.microsoft.com/office/drawing/2014/main" id="{1FD7D30A-3026-4E94-B587-24F28E7E95E7}"/>
               </a:ext>
             </a:extLst>
           </p:cNvPr>
@@ -17238,7 +17535,7 @@
               <a:buNone/>
             </a:pPr>
             <a:r>
-              <a:rPr lang="es-ES" sz="3000" b="1" i="0" u="none" strike="noStrike" cap="none" dirty="0">
+              <a:rPr lang="es" sz="3000" b="1" i="0" u="none" strike="noStrike" cap="none" dirty="0">
                 <a:solidFill>
                   <a:schemeClr val="lt1"/>
                 </a:solidFill>
@@ -17247,12 +17544,361 @@
                 <a:cs typeface="Times New Roman"/>
                 <a:sym typeface="Times New Roman"/>
               </a:rPr>
-              <a:t>Der</a:t>
+              <a:t>Requerimientos</a:t>
             </a:r>
             <a:endParaRPr sz="1400" i="0" u="none" strike="noStrike" cap="none" dirty="0">
               <a:solidFill>
                 <a:srgbClr val="000000"/>
               </a:solidFill>
+              <a:latin typeface="Times New Roman"/>
+              <a:ea typeface="Times New Roman"/>
+              <a:cs typeface="Times New Roman"/>
+              <a:sym typeface="Times New Roman"/>
+            </a:endParaRPr>
+          </a:p>
+        </p:txBody>
+      </p:sp>
+      <p:sp>
+        <p:nvSpPr>
+          <p:cNvPr id="5" name="Google Shape;234;p43">
+            <a:extLst>
+              <a:ext uri="{FF2B5EF4-FFF2-40B4-BE49-F238E27FC236}">
+                <a16:creationId xmlns:a16="http://schemas.microsoft.com/office/drawing/2014/main" id="{E89D7071-9E65-4956-A421-504375727EC2}"/>
+              </a:ext>
+            </a:extLst>
+          </p:cNvPr>
+          <p:cNvSpPr txBox="1"/>
+          <p:nvPr/>
+        </p:nvSpPr>
+        <p:spPr>
+          <a:xfrm>
+            <a:off x="132521" y="1000538"/>
+            <a:ext cx="8824665" cy="4320000"/>
+          </a:xfrm>
+          <a:prstGeom prst="rect">
+            <a:avLst/>
+          </a:prstGeom>
+          <a:noFill/>
+          <a:ln>
+            <a:noFill/>
+          </a:ln>
+        </p:spPr>
+        <p:txBody>
+          <a:bodyPr spcFirstLastPara="1" wrap="square" lIns="91425" tIns="91425" rIns="91425" bIns="91425" anchor="t" anchorCtr="0">
+            <a:noAutofit/>
+          </a:bodyPr>
+          <a:lstStyle/>
+          <a:p>
+            <a:pPr marL="457200" lvl="0" indent="0" algn="l" rtl="0">
+              <a:lnSpc>
+                <a:spcPct val="115000"/>
+              </a:lnSpc>
+              <a:spcBef>
+                <a:spcPts val="0"/>
+              </a:spcBef>
+              <a:spcAft>
+                <a:spcPts val="0"/>
+              </a:spcAft>
+              <a:buNone/>
+            </a:pPr>
+            <a:r>
+              <a:rPr lang="es-CO" sz="2000" b="1" dirty="0">
+                <a:latin typeface="Times New Roman"/>
+                <a:ea typeface="Times New Roman"/>
+                <a:cs typeface="Times New Roman"/>
+                <a:sym typeface="Times New Roman"/>
+              </a:rPr>
+              <a:t>No Funcionales:</a:t>
+            </a:r>
+          </a:p>
+          <a:p>
+            <a:pPr marL="457200" lvl="0" indent="0" algn="l" rtl="0">
+              <a:lnSpc>
+                <a:spcPct val="115000"/>
+              </a:lnSpc>
+              <a:spcBef>
+                <a:spcPts val="0"/>
+              </a:spcBef>
+              <a:spcAft>
+                <a:spcPts val="0"/>
+              </a:spcAft>
+              <a:buNone/>
+            </a:pPr>
+            <a:r>
+              <a:rPr lang="es-CO" sz="2000" b="1" dirty="0">
+                <a:latin typeface="Times New Roman"/>
+                <a:ea typeface="Times New Roman"/>
+                <a:cs typeface="Times New Roman"/>
+                <a:sym typeface="Times New Roman"/>
+              </a:rPr>
+              <a:t>	1. </a:t>
+            </a:r>
+            <a:r>
+              <a:rPr lang="es-CO" sz="2000" dirty="0">
+                <a:latin typeface="Times New Roman"/>
+                <a:ea typeface="Times New Roman"/>
+                <a:cs typeface="Times New Roman"/>
+                <a:sym typeface="Times New Roman"/>
+              </a:rPr>
+              <a:t>Interfaz gráfica.</a:t>
+            </a:r>
+          </a:p>
+          <a:p>
+            <a:pPr marL="457200" lvl="0" indent="0" algn="l" rtl="0">
+              <a:lnSpc>
+                <a:spcPct val="115000"/>
+              </a:lnSpc>
+              <a:spcBef>
+                <a:spcPts val="0"/>
+              </a:spcBef>
+              <a:spcAft>
+                <a:spcPts val="0"/>
+              </a:spcAft>
+              <a:buNone/>
+            </a:pPr>
+            <a:r>
+              <a:rPr lang="es-CO" sz="2000" b="1" dirty="0">
+                <a:latin typeface="Times New Roman"/>
+                <a:ea typeface="Times New Roman"/>
+                <a:cs typeface="Times New Roman"/>
+                <a:sym typeface="Times New Roman"/>
+              </a:rPr>
+              <a:t>	2. </a:t>
+            </a:r>
+            <a:r>
+              <a:rPr lang="es-CO" sz="2000" dirty="0">
+                <a:latin typeface="Times New Roman"/>
+                <a:ea typeface="Times New Roman"/>
+                <a:cs typeface="Times New Roman"/>
+                <a:sym typeface="Times New Roman"/>
+              </a:rPr>
+              <a:t>Comodidad administrador (SENCILLO).</a:t>
+            </a:r>
+          </a:p>
+          <a:p>
+            <a:pPr marL="457200" lvl="0" indent="0" algn="l" rtl="0">
+              <a:lnSpc>
+                <a:spcPct val="115000"/>
+              </a:lnSpc>
+              <a:spcBef>
+                <a:spcPts val="0"/>
+              </a:spcBef>
+              <a:spcAft>
+                <a:spcPts val="0"/>
+              </a:spcAft>
+              <a:buNone/>
+            </a:pPr>
+            <a:r>
+              <a:rPr lang="es-CO" sz="2000" b="1" dirty="0">
+                <a:latin typeface="Times New Roman"/>
+                <a:ea typeface="Times New Roman"/>
+                <a:cs typeface="Times New Roman"/>
+                <a:sym typeface="Times New Roman"/>
+              </a:rPr>
+              <a:t>	3. </a:t>
+            </a:r>
+            <a:r>
+              <a:rPr lang="es-CO" sz="2000" dirty="0">
+                <a:latin typeface="Times New Roman"/>
+                <a:ea typeface="Times New Roman"/>
+                <a:cs typeface="Times New Roman"/>
+                <a:sym typeface="Times New Roman"/>
+              </a:rPr>
+              <a:t>Diseño del aplicativo (SISTEMA SENCILLO DE UTILZAR).</a:t>
+            </a:r>
+          </a:p>
+          <a:p>
+            <a:pPr marL="457200" lvl="0" indent="0" algn="l" rtl="0">
+              <a:lnSpc>
+                <a:spcPct val="115000"/>
+              </a:lnSpc>
+              <a:spcBef>
+                <a:spcPts val="0"/>
+              </a:spcBef>
+              <a:spcAft>
+                <a:spcPts val="0"/>
+              </a:spcAft>
+              <a:buNone/>
+            </a:pPr>
+            <a:r>
+              <a:rPr lang="es-CO" sz="2000" b="1" dirty="0">
+                <a:latin typeface="Times New Roman"/>
+                <a:ea typeface="Times New Roman"/>
+                <a:cs typeface="Times New Roman"/>
+                <a:sym typeface="Times New Roman"/>
+              </a:rPr>
+              <a:t>	4. </a:t>
+            </a:r>
+            <a:r>
+              <a:rPr lang="es-CO" sz="2000" dirty="0">
+                <a:latin typeface="Times New Roman"/>
+                <a:ea typeface="Times New Roman"/>
+                <a:cs typeface="Times New Roman"/>
+                <a:sym typeface="Times New Roman"/>
+              </a:rPr>
+              <a:t>Actualización de servicios (JUEGOS-PRODUCTOS-SERVICIOS).</a:t>
+            </a:r>
+          </a:p>
+          <a:p>
+            <a:pPr marL="457200" lvl="0" indent="0" algn="l" rtl="0">
+              <a:lnSpc>
+                <a:spcPct val="115000"/>
+              </a:lnSpc>
+              <a:spcBef>
+                <a:spcPts val="0"/>
+              </a:spcBef>
+              <a:spcAft>
+                <a:spcPts val="0"/>
+              </a:spcAft>
+              <a:buNone/>
+            </a:pPr>
+            <a:r>
+              <a:rPr lang="es-CO" sz="2000" b="1" dirty="0">
+                <a:latin typeface="Times New Roman"/>
+                <a:ea typeface="Times New Roman"/>
+                <a:cs typeface="Times New Roman"/>
+                <a:sym typeface="Times New Roman"/>
+              </a:rPr>
+              <a:t>	5. </a:t>
+            </a:r>
+            <a:r>
+              <a:rPr lang="es-CO" sz="2000" dirty="0">
+                <a:latin typeface="Times New Roman"/>
+                <a:ea typeface="Times New Roman"/>
+                <a:cs typeface="Times New Roman"/>
+                <a:sym typeface="Times New Roman"/>
+              </a:rPr>
+              <a:t>Información general (INFORMACIÓN BÁSICA EMPRESA).</a:t>
+            </a:r>
+          </a:p>
+          <a:p>
+            <a:pPr marL="457200" lvl="0" indent="0" algn="l" rtl="0">
+              <a:lnSpc>
+                <a:spcPct val="115000"/>
+              </a:lnSpc>
+              <a:spcBef>
+                <a:spcPts val="0"/>
+              </a:spcBef>
+              <a:spcAft>
+                <a:spcPts val="0"/>
+              </a:spcAft>
+              <a:buNone/>
+            </a:pPr>
+            <a:r>
+              <a:rPr lang="es-CO" sz="2000" b="1" dirty="0">
+                <a:latin typeface="Times New Roman"/>
+                <a:ea typeface="Times New Roman"/>
+                <a:cs typeface="Times New Roman"/>
+                <a:sym typeface="Times New Roman"/>
+              </a:rPr>
+              <a:t>	6. </a:t>
+            </a:r>
+            <a:r>
+              <a:rPr lang="es-CO" sz="2000" dirty="0">
+                <a:latin typeface="Times New Roman"/>
+                <a:ea typeface="Times New Roman"/>
+                <a:cs typeface="Times New Roman"/>
+                <a:sym typeface="Times New Roman"/>
+              </a:rPr>
+              <a:t>Archivos multimedia (IMÁGENES DE SERVICIOS-PROMOCIONES)</a:t>
+            </a:r>
+          </a:p>
+          <a:p>
+            <a:pPr marL="457200" lvl="0" indent="0" algn="l" rtl="0">
+              <a:lnSpc>
+                <a:spcPct val="115000"/>
+              </a:lnSpc>
+              <a:spcBef>
+                <a:spcPts val="0"/>
+              </a:spcBef>
+              <a:spcAft>
+                <a:spcPts val="0"/>
+              </a:spcAft>
+              <a:buNone/>
+            </a:pPr>
+            <a:r>
+              <a:rPr lang="es-CO" sz="2000" b="1" dirty="0">
+                <a:latin typeface="Times New Roman"/>
+                <a:ea typeface="Times New Roman"/>
+                <a:cs typeface="Times New Roman"/>
+                <a:sym typeface="Times New Roman"/>
+              </a:rPr>
+              <a:t>	7.  </a:t>
+            </a:r>
+            <a:r>
+              <a:rPr lang="es-CO" sz="2000" dirty="0">
+                <a:latin typeface="Times New Roman"/>
+                <a:ea typeface="Times New Roman"/>
+                <a:cs typeface="Times New Roman"/>
+                <a:sym typeface="Times New Roman"/>
+              </a:rPr>
+              <a:t>Calidad de conexión.</a:t>
+            </a:r>
+          </a:p>
+          <a:p>
+            <a:pPr marL="457200" lvl="0" indent="0" algn="l" rtl="0">
+              <a:lnSpc>
+                <a:spcPct val="115000"/>
+              </a:lnSpc>
+              <a:spcBef>
+                <a:spcPts val="0"/>
+              </a:spcBef>
+              <a:spcAft>
+                <a:spcPts val="0"/>
+              </a:spcAft>
+              <a:buNone/>
+            </a:pPr>
+            <a:r>
+              <a:rPr lang="es-CO" sz="2000" b="1" dirty="0">
+                <a:latin typeface="Times New Roman"/>
+                <a:ea typeface="Times New Roman"/>
+                <a:cs typeface="Times New Roman"/>
+                <a:sym typeface="Times New Roman"/>
+              </a:rPr>
+              <a:t>	8. </a:t>
+            </a:r>
+            <a:r>
+              <a:rPr lang="es-CO" sz="2000" dirty="0">
+                <a:latin typeface="Times New Roman"/>
+                <a:ea typeface="Times New Roman"/>
+                <a:cs typeface="Times New Roman"/>
+                <a:sym typeface="Times New Roman"/>
+              </a:rPr>
+              <a:t>Correos de aviso (RECUPERAR CONTRASEÑA)</a:t>
+            </a:r>
+          </a:p>
+          <a:p>
+            <a:pPr marL="457200" lvl="0" indent="0" algn="l" rtl="0">
+              <a:lnSpc>
+                <a:spcPct val="115000"/>
+              </a:lnSpc>
+              <a:spcBef>
+                <a:spcPts val="0"/>
+              </a:spcBef>
+              <a:spcAft>
+                <a:spcPts val="0"/>
+              </a:spcAft>
+              <a:buNone/>
+            </a:pPr>
+            <a:r>
+              <a:rPr lang="es-CO" sz="2000" b="1" dirty="0">
+                <a:latin typeface="Times New Roman"/>
+                <a:ea typeface="Times New Roman"/>
+                <a:cs typeface="Times New Roman"/>
+                <a:sym typeface="Times New Roman"/>
+              </a:rPr>
+              <a:t>	9. </a:t>
+            </a:r>
+            <a:r>
+              <a:rPr lang="es-CO" sz="2000" dirty="0">
+                <a:latin typeface="Times New Roman"/>
+                <a:ea typeface="Times New Roman"/>
+                <a:cs typeface="Times New Roman"/>
+                <a:sym typeface="Times New Roman"/>
+              </a:rPr>
+              <a:t>Inicio sesión.</a:t>
+            </a:r>
+            <a:endParaRPr lang="es-CO" b="1" dirty="0">
               <a:latin typeface="Times New Roman"/>
               <a:ea typeface="Times New Roman"/>
               <a:cs typeface="Times New Roman"/>
@@ -17264,7 +17910,7 @@
     </p:spTree>
     <p:extLst>
       <p:ext uri="{BB962C8B-B14F-4D97-AF65-F5344CB8AC3E}">
-        <p14:creationId xmlns:p14="http://schemas.microsoft.com/office/powerpoint/2010/main" val="2713549774"/>
+        <p14:creationId xmlns:p14="http://schemas.microsoft.com/office/powerpoint/2010/main" val="941915840"/>
       </p:ext>
     </p:extLst>
   </p:cSld>
@@ -17293,10 +17939,10 @@
       </p:grpSpPr>
       <p:sp>
         <p:nvSpPr>
-          <p:cNvPr id="2" name="Google Shape;233;p43">
+          <p:cNvPr id="3" name="Google Shape;233;p43">
             <a:extLst>
               <a:ext uri="{FF2B5EF4-FFF2-40B4-BE49-F238E27FC236}">
-                <a16:creationId xmlns:a16="http://schemas.microsoft.com/office/drawing/2014/main" id="{37C55CDF-E23F-45CB-BF26-E1761ACABCDA}"/>
+                <a16:creationId xmlns:a16="http://schemas.microsoft.com/office/drawing/2014/main" id="{2D685682-A694-4E5F-9EE4-F1590CD158C6}"/>
               </a:ext>
             </a:extLst>
           </p:cNvPr>
@@ -17347,7 +17993,7 @@
               <a:buNone/>
             </a:pPr>
             <a:r>
-              <a:rPr lang="es-ES" sz="3000" b="1" i="0" u="none" strike="noStrike" cap="none" dirty="0">
+              <a:rPr lang="es" sz="3000" b="1" i="0" u="none" strike="noStrike" cap="none" dirty="0">
                 <a:solidFill>
                   <a:schemeClr val="lt1"/>
                 </a:solidFill>
@@ -17356,27 +18002,8 @@
                 <a:cs typeface="Times New Roman"/>
                 <a:sym typeface="Times New Roman"/>
               </a:rPr>
-              <a:t>Kyukeisho</a:t>
+              <a:t>Casos De Uso</a:t>
             </a:r>
-          </a:p>
-          <a:p>
-            <a:pPr marL="0" marR="0" lvl="0" indent="0" algn="ctr" rtl="0">
-              <a:lnSpc>
-                <a:spcPct val="100000"/>
-              </a:lnSpc>
-              <a:spcBef>
-                <a:spcPts val="0"/>
-              </a:spcBef>
-              <a:spcAft>
-                <a:spcPts val="0"/>
-              </a:spcAft>
-              <a:buClr>
-                <a:schemeClr val="dk1"/>
-              </a:buClr>
-              <a:buSzPts val="5400"/>
-              <a:buFont typeface="Calibri"/>
-              <a:buNone/>
-            </a:pPr>
             <a:endParaRPr sz="1400" i="0" u="none" strike="noStrike" cap="none" dirty="0">
               <a:solidFill>
                 <a:srgbClr val="000000"/>
@@ -17389,80 +18016,41 @@
           </a:p>
         </p:txBody>
       </p:sp>
-      <p:sp>
-        <p:nvSpPr>
-          <p:cNvPr id="3" name="Google Shape;234;p43">
+      <p:pic>
+        <p:nvPicPr>
+          <p:cNvPr id="5" name="Imagen 4">
+            <a:hlinkClick r:id="rId2" action="ppaction://hlinkfile"/>
             <a:extLst>
               <a:ext uri="{FF2B5EF4-FFF2-40B4-BE49-F238E27FC236}">
-                <a16:creationId xmlns:a16="http://schemas.microsoft.com/office/drawing/2014/main" id="{2F0356A7-62C2-4BF3-8D2A-FBB857B9A705}"/>
+                <a16:creationId xmlns:a16="http://schemas.microsoft.com/office/drawing/2014/main" id="{8612F421-A599-4355-8621-CA828C0FA9B7}"/>
               </a:ext>
             </a:extLst>
           </p:cNvPr>
-          <p:cNvSpPr txBox="1"/>
+          <p:cNvPicPr>
+            <a:picLocks noChangeAspect="1"/>
+          </p:cNvPicPr>
           <p:nvPr/>
-        </p:nvSpPr>
+        </p:nvPicPr>
+        <p:blipFill>
+          <a:blip r:embed="rId3"/>
+          <a:stretch>
+            <a:fillRect/>
+          </a:stretch>
+        </p:blipFill>
         <p:spPr>
           <a:xfrm>
-            <a:off x="132522" y="1000538"/>
-            <a:ext cx="7920000" cy="4320000"/>
+            <a:off x="766916" y="1419850"/>
+            <a:ext cx="7434218" cy="2699866"/>
           </a:xfrm>
           <a:prstGeom prst="rect">
             <a:avLst/>
           </a:prstGeom>
-          <a:noFill/>
-          <a:ln>
-            <a:noFill/>
-          </a:ln>
         </p:spPr>
-        <p:txBody>
-          <a:bodyPr spcFirstLastPara="1" wrap="square" lIns="91425" tIns="91425" rIns="91425" bIns="91425" anchor="t" anchorCtr="0">
-            <a:noAutofit/>
-          </a:bodyPr>
-          <a:lstStyle/>
-          <a:p>
-            <a:pPr marL="457200" lvl="0" indent="0" algn="l" rtl="0">
-              <a:lnSpc>
-                <a:spcPct val="115000"/>
-              </a:lnSpc>
-              <a:spcBef>
-                <a:spcPts val="0"/>
-              </a:spcBef>
-              <a:spcAft>
-                <a:spcPts val="0"/>
-              </a:spcAft>
-              <a:buNone/>
-            </a:pPr>
-            <a:r>
-              <a:rPr lang="es-CO" dirty="0">
-                <a:latin typeface="Times New Roman"/>
-                <a:ea typeface="Times New Roman"/>
-                <a:cs typeface="Times New Roman"/>
-                <a:sym typeface="Times New Roman"/>
-              </a:rPr>
-              <a:t>Kyukeisho es una empresa diseñadora de software para empresa necesitadas, en este caso el software diseñado fue creado para solucionar los problemas de publicidad de una tienda de barrio, el precio estipulado esta alrededor de los $20’125,000, teniendo en cuenta el grupo de desarrolladores, dada la opción de venta, se entregara la debida documentación, los contratos empresa-cliente, y el </a:t>
-            </a:r>
-            <a:r>
-              <a:rPr lang="es-CO">
-                <a:latin typeface="Times New Roman"/>
-                <a:ea typeface="Times New Roman"/>
-                <a:cs typeface="Times New Roman"/>
-                <a:sym typeface="Times New Roman"/>
-              </a:rPr>
-              <a:t>debido mantenimiento.</a:t>
-            </a:r>
-            <a:endParaRPr dirty="0">
-              <a:latin typeface="Times New Roman"/>
-              <a:ea typeface="Times New Roman"/>
-              <a:cs typeface="Times New Roman"/>
-              <a:sym typeface="Times New Roman"/>
-            </a:endParaRPr>
-          </a:p>
-        </p:txBody>
-      </p:sp>
+      </p:pic>
     </p:spTree>
     <p:extLst>
       <p:ext uri="{BB962C8B-B14F-4D97-AF65-F5344CB8AC3E}">
-        <p14:creationId xmlns:p14="http://schemas.microsoft.com/office/powerpoint/2010/main" val="3708971287"/>
+        <p14:creationId xmlns:p14="http://schemas.microsoft.com/office/powerpoint/2010/main" val="2354537437"/>
       </p:ext>
     </p:extLst>
   </p:cSld>
@@ -17473,6 +18061,146 @@
 </file>
 
 <file path=ppt/slides/slide7.xml><?xml version="1.0" encoding="utf-8"?>
+<p:sld xmlns:a="http://schemas.openxmlformats.org/drawingml/2006/main" xmlns:r="http://schemas.openxmlformats.org/officeDocument/2006/relationships" xmlns:p="http://schemas.openxmlformats.org/presentationml/2006/main">
+  <p:cSld>
+    <p:spTree>
+      <p:nvGrpSpPr>
+        <p:cNvPr id="1" name=""/>
+        <p:cNvGrpSpPr/>
+        <p:nvPr/>
+      </p:nvGrpSpPr>
+      <p:grpSpPr>
+        <a:xfrm>
+          <a:off x="0" y="0"/>
+          <a:ext cx="0" cy="0"/>
+          <a:chOff x="0" y="0"/>
+          <a:chExt cx="0" cy="0"/>
+        </a:xfrm>
+      </p:grpSpPr>
+      <p:sp>
+        <p:nvSpPr>
+          <p:cNvPr id="2" name="Google Shape;233;p43">
+            <a:extLst>
+              <a:ext uri="{FF2B5EF4-FFF2-40B4-BE49-F238E27FC236}">
+                <a16:creationId xmlns:a16="http://schemas.microsoft.com/office/drawing/2014/main" id="{1A787EE9-87A0-4F0D-9546-6AB5BE8B33CE}"/>
+              </a:ext>
+            </a:extLst>
+          </p:cNvPr>
+          <p:cNvSpPr txBox="1"/>
+          <p:nvPr/>
+        </p:nvSpPr>
+        <p:spPr>
+          <a:xfrm>
+            <a:off x="1598426" y="0"/>
+            <a:ext cx="5274322" cy="879600"/>
+          </a:xfrm>
+          <a:prstGeom prst="rect">
+            <a:avLst/>
+          </a:prstGeom>
+          <a:noFill/>
+          <a:ln>
+            <a:noFill/>
+          </a:ln>
+          <a:effectLst>
+            <a:outerShdw blurRad="57150" dist="19050" dir="5400000" algn="bl" rotWithShape="0">
+              <a:srgbClr val="000000">
+                <a:alpha val="49803"/>
+              </a:srgbClr>
+            </a:outerShdw>
+          </a:effectLst>
+        </p:spPr>
+        <p:txBody>
+          <a:bodyPr spcFirstLastPara="1" wrap="square" lIns="91425" tIns="45700" rIns="91425" bIns="45700" anchor="ctr" anchorCtr="0">
+            <a:noAutofit/>
+          </a:bodyPr>
+          <a:lstStyle/>
+          <a:p>
+            <a:pPr marL="0" marR="0" lvl="0" indent="0" algn="ctr" rtl="0">
+              <a:lnSpc>
+                <a:spcPct val="100000"/>
+              </a:lnSpc>
+              <a:spcBef>
+                <a:spcPts val="0"/>
+              </a:spcBef>
+              <a:spcAft>
+                <a:spcPts val="0"/>
+              </a:spcAft>
+              <a:buClr>
+                <a:schemeClr val="dk1"/>
+              </a:buClr>
+              <a:buSzPts val="5400"/>
+              <a:buFont typeface="Calibri"/>
+              <a:buNone/>
+            </a:pPr>
+            <a:r>
+              <a:rPr lang="es" sz="3000" b="1" i="0" u="none" strike="noStrike" cap="none" dirty="0">
+                <a:solidFill>
+                  <a:schemeClr val="lt1"/>
+                </a:solidFill>
+                <a:latin typeface="Times New Roman"/>
+                <a:ea typeface="Times New Roman"/>
+                <a:cs typeface="Times New Roman"/>
+                <a:sym typeface="Times New Roman"/>
+              </a:rPr>
+              <a:t>Diagrama Entidad Relación</a:t>
+            </a:r>
+            <a:endParaRPr sz="1400" i="0" u="none" strike="noStrike" cap="none" dirty="0">
+              <a:solidFill>
+                <a:srgbClr val="000000"/>
+              </a:solidFill>
+              <a:latin typeface="Times New Roman"/>
+              <a:ea typeface="Times New Roman"/>
+              <a:cs typeface="Times New Roman"/>
+              <a:sym typeface="Times New Roman"/>
+            </a:endParaRPr>
+          </a:p>
+        </p:txBody>
+      </p:sp>
+      <p:pic>
+        <p:nvPicPr>
+          <p:cNvPr id="7" name="Imagen 6">
+            <a:hlinkClick r:id="rId2" action="ppaction://hlinkfile"/>
+            <a:extLst>
+              <a:ext uri="{FF2B5EF4-FFF2-40B4-BE49-F238E27FC236}">
+                <a16:creationId xmlns:a16="http://schemas.microsoft.com/office/drawing/2014/main" id="{E6F22500-D06E-452A-9D6C-D33268324D87}"/>
+              </a:ext>
+            </a:extLst>
+          </p:cNvPr>
+          <p:cNvPicPr>
+            <a:picLocks noChangeAspect="1"/>
+          </p:cNvPicPr>
+          <p:nvPr/>
+        </p:nvPicPr>
+        <p:blipFill>
+          <a:blip r:embed="rId3"/>
+          <a:stretch>
+            <a:fillRect/>
+          </a:stretch>
+        </p:blipFill>
+        <p:spPr>
+          <a:xfrm>
+            <a:off x="965881" y="1132833"/>
+            <a:ext cx="6539411" cy="3478496"/>
+          </a:xfrm>
+          <a:prstGeom prst="rect">
+            <a:avLst/>
+          </a:prstGeom>
+        </p:spPr>
+      </p:pic>
+    </p:spTree>
+    <p:extLst>
+      <p:ext uri="{BB962C8B-B14F-4D97-AF65-F5344CB8AC3E}">
+        <p14:creationId xmlns:p14="http://schemas.microsoft.com/office/powerpoint/2010/main" val="2713549774"/>
+      </p:ext>
+    </p:extLst>
+  </p:cSld>
+  <p:clrMapOvr>
+    <a:masterClrMapping/>
+  </p:clrMapOvr>
+</p:sld>
+</file>
+
+<file path=ppt/slides/slide8.xml><?xml version="1.0" encoding="utf-8"?>
 <p:sld xmlns:a="http://schemas.openxmlformats.org/drawingml/2006/main" xmlns:r="http://schemas.openxmlformats.org/officeDocument/2006/relationships" xmlns:p="http://schemas.openxmlformats.org/presentationml/2006/main">
   <p:cSld>
     <p:spTree>

</xml_diff>